<commit_message>
Added microphone class + altered software API!
Added lots of little things
</commit_message>
<xml_diff>
--- a/project-01/docs/Cooney_Project_01_Software_Diagrams.pptx
+++ b/project-01/docs/Cooney_Project_01_Software_Diagrams.pptx
@@ -9,7 +9,7 @@
     <p:sldId id="257" r:id="rId3"/>
     <p:sldId id="262" r:id="rId4"/>
     <p:sldId id="258" r:id="rId5"/>
-    <p:sldId id="259" r:id="rId6"/>
+    <p:sldId id="264" r:id="rId6"/>
     <p:sldId id="260" r:id="rId7"/>
     <p:sldId id="261" r:id="rId8"/>
   </p:sldIdLst>
@@ -265,7 +265,7 @@
           <a:p>
             <a:fld id="{6F9CC634-B9D1-8E43-9326-87ACE5943230}" type="datetimeFigureOut">
               <a:rPr lang="en-US" smtClean="0"/>
-              <a:t>3/4/23</a:t>
+              <a:t>3/6/23</a:t>
             </a:fld>
             <a:endParaRPr lang="en-US"/>
           </a:p>
@@ -463,7 +463,7 @@
           <a:p>
             <a:fld id="{6F9CC634-B9D1-8E43-9326-87ACE5943230}" type="datetimeFigureOut">
               <a:rPr lang="en-US" smtClean="0"/>
-              <a:t>3/4/23</a:t>
+              <a:t>3/6/23</a:t>
             </a:fld>
             <a:endParaRPr lang="en-US"/>
           </a:p>
@@ -671,7 +671,7 @@
           <a:p>
             <a:fld id="{6F9CC634-B9D1-8E43-9326-87ACE5943230}" type="datetimeFigureOut">
               <a:rPr lang="en-US" smtClean="0"/>
-              <a:t>3/4/23</a:t>
+              <a:t>3/6/23</a:t>
             </a:fld>
             <a:endParaRPr lang="en-US"/>
           </a:p>
@@ -869,7 +869,7 @@
           <a:p>
             <a:fld id="{6F9CC634-B9D1-8E43-9326-87ACE5943230}" type="datetimeFigureOut">
               <a:rPr lang="en-US" smtClean="0"/>
-              <a:t>3/4/23</a:t>
+              <a:t>3/6/23</a:t>
             </a:fld>
             <a:endParaRPr lang="en-US"/>
           </a:p>
@@ -1144,7 +1144,7 @@
           <a:p>
             <a:fld id="{6F9CC634-B9D1-8E43-9326-87ACE5943230}" type="datetimeFigureOut">
               <a:rPr lang="en-US" smtClean="0"/>
-              <a:t>3/4/23</a:t>
+              <a:t>3/6/23</a:t>
             </a:fld>
             <a:endParaRPr lang="en-US"/>
           </a:p>
@@ -1409,7 +1409,7 @@
           <a:p>
             <a:fld id="{6F9CC634-B9D1-8E43-9326-87ACE5943230}" type="datetimeFigureOut">
               <a:rPr lang="en-US" smtClean="0"/>
-              <a:t>3/4/23</a:t>
+              <a:t>3/6/23</a:t>
             </a:fld>
             <a:endParaRPr lang="en-US"/>
           </a:p>
@@ -1821,7 +1821,7 @@
           <a:p>
             <a:fld id="{6F9CC634-B9D1-8E43-9326-87ACE5943230}" type="datetimeFigureOut">
               <a:rPr lang="en-US" smtClean="0"/>
-              <a:t>3/4/23</a:t>
+              <a:t>3/6/23</a:t>
             </a:fld>
             <a:endParaRPr lang="en-US"/>
           </a:p>
@@ -1962,7 +1962,7 @@
           <a:p>
             <a:fld id="{6F9CC634-B9D1-8E43-9326-87ACE5943230}" type="datetimeFigureOut">
               <a:rPr lang="en-US" smtClean="0"/>
-              <a:t>3/4/23</a:t>
+              <a:t>3/6/23</a:t>
             </a:fld>
             <a:endParaRPr lang="en-US"/>
           </a:p>
@@ -2075,7 +2075,7 @@
           <a:p>
             <a:fld id="{6F9CC634-B9D1-8E43-9326-87ACE5943230}" type="datetimeFigureOut">
               <a:rPr lang="en-US" smtClean="0"/>
-              <a:t>3/4/23</a:t>
+              <a:t>3/6/23</a:t>
             </a:fld>
             <a:endParaRPr lang="en-US"/>
           </a:p>
@@ -2386,7 +2386,7 @@
           <a:p>
             <a:fld id="{6F9CC634-B9D1-8E43-9326-87ACE5943230}" type="datetimeFigureOut">
               <a:rPr lang="en-US" smtClean="0"/>
-              <a:t>3/4/23</a:t>
+              <a:t>3/6/23</a:t>
             </a:fld>
             <a:endParaRPr lang="en-US"/>
           </a:p>
@@ -2674,7 +2674,7 @@
           <a:p>
             <a:fld id="{6F9CC634-B9D1-8E43-9326-87ACE5943230}" type="datetimeFigureOut">
               <a:rPr lang="en-US" smtClean="0"/>
-              <a:t>3/4/23</a:t>
+              <a:t>3/6/23</a:t>
             </a:fld>
             <a:endParaRPr lang="en-US"/>
           </a:p>
@@ -2915,7 +2915,7 @@
           <a:p>
             <a:fld id="{6F9CC634-B9D1-8E43-9326-87ACE5943230}" type="datetimeFigureOut">
               <a:rPr lang="en-US" smtClean="0"/>
-              <a:t>3/4/23</a:t>
+              <a:t>3/6/23</a:t>
             </a:fld>
             <a:endParaRPr lang="en-US"/>
           </a:p>
@@ -4011,7 +4011,7 @@
           <p:cNvPr id="4" name="TextBox 3">
             <a:extLst>
               <a:ext uri="{FF2B5EF4-FFF2-40B4-BE49-F238E27FC236}">
-                <a16:creationId xmlns:a16="http://schemas.microsoft.com/office/drawing/2014/main" id="{CA272C79-6916-8C2B-CA7B-F1B0C6A0FFA9}"/>
+                <a16:creationId xmlns:a16="http://schemas.microsoft.com/office/drawing/2014/main" id="{3101E37C-D4B0-B640-23D0-EF90BDFCCFE2}"/>
               </a:ext>
             </a:extLst>
           </p:cNvPr>
@@ -4020,8 +4020,8 @@
         </p:nvSpPr>
         <p:spPr>
           <a:xfrm>
-            <a:off x="990600" y="1219200"/>
-            <a:ext cx="11696700" cy="3170099"/>
+            <a:off x="495300" y="1079848"/>
+            <a:ext cx="11696700" cy="4401205"/>
           </a:xfrm>
           <a:prstGeom prst="rect">
             <a:avLst/>
@@ -4034,23 +4034,7 @@
           </a:bodyPr>
           <a:lstStyle/>
           <a:p>
-            <a:r>
-              <a:rPr lang="en-US" sz="2000" dirty="0" err="1">
-                <a:latin typeface="Source Sans Pro" panose="020B0503030403020204" pitchFamily="34" charset="0"/>
-                <a:ea typeface="Source Sans Pro" panose="020B0503030403020204" pitchFamily="34" charset="0"/>
-              </a:rPr>
-              <a:t>ledBlink</a:t>
-            </a:r>
-            <a:r>
-              <a:rPr lang="en-US" sz="2000" dirty="0">
-                <a:latin typeface="Source Sans Pro" panose="020B0503030403020204" pitchFamily="34" charset="0"/>
-                <a:ea typeface="Source Sans Pro" panose="020B0503030403020204" pitchFamily="34" charset="0"/>
-              </a:rPr>
-              <a:t>(tempo)</a:t>
-            </a:r>
-          </a:p>
-          <a:p>
-            <a:pPr marL="285750" indent="-285750">
+            <a:pPr marL="342900" indent="-342900">
               <a:buFont typeface="Arial" panose="020B0604020202020204" pitchFamily="34" charset="0"/>
               <a:buChar char="•"/>
             </a:pPr>
@@ -4059,11 +4043,11 @@
                 <a:latin typeface="Source Sans Pro" panose="020B0503030403020204" pitchFamily="34" charset="0"/>
                 <a:ea typeface="Source Sans Pro" panose="020B0503030403020204" pitchFamily="34" charset="0"/>
               </a:rPr>
-              <a:t>Takes integer bpm as input</a:t>
-            </a:r>
-          </a:p>
-          <a:p>
-            <a:pPr marL="285750" indent="-285750">
+              <a:t>Motor</a:t>
+            </a:r>
+          </a:p>
+          <a:p>
+            <a:pPr marL="800100" lvl="1" indent="-342900">
               <a:buFont typeface="Arial" panose="020B0604020202020204" pitchFamily="34" charset="0"/>
               <a:buChar char="•"/>
             </a:pPr>
@@ -4072,11 +4056,11 @@
                 <a:latin typeface="Source Sans Pro" panose="020B0503030403020204" pitchFamily="34" charset="0"/>
                 <a:ea typeface="Source Sans Pro" panose="020B0503030403020204" pitchFamily="34" charset="0"/>
               </a:rPr>
-              <a:t>Activates individual LEDs consecutively to generate visual 4-beat measure</a:t>
-            </a:r>
-          </a:p>
-          <a:p>
-            <a:pPr marL="285750" indent="-285750">
+              <a:t>driveMeasure(), drive4(), setup</a:t>
+            </a:r>
+          </a:p>
+          <a:p>
+            <a:pPr marL="800100" lvl="1" indent="-342900">
               <a:buFont typeface="Arial" panose="020B0604020202020204" pitchFamily="34" charset="0"/>
               <a:buChar char="•"/>
             </a:pPr>
@@ -4086,23 +4070,7 @@
             </a:endParaRPr>
           </a:p>
           <a:p>
-            <a:r>
-              <a:rPr lang="en-US" sz="2000" dirty="0" err="1">
-                <a:latin typeface="Source Sans Pro" panose="020B0503030403020204" pitchFamily="34" charset="0"/>
-                <a:ea typeface="Source Sans Pro" panose="020B0503030403020204" pitchFamily="34" charset="0"/>
-              </a:rPr>
-              <a:t>driveMotor</a:t>
-            </a:r>
-            <a:r>
-              <a:rPr lang="en-US" sz="2000" dirty="0">
-                <a:latin typeface="Source Sans Pro" panose="020B0503030403020204" pitchFamily="34" charset="0"/>
-                <a:ea typeface="Source Sans Pro" panose="020B0503030403020204" pitchFamily="34" charset="0"/>
-              </a:rPr>
-              <a:t>(type, tempo)</a:t>
-            </a:r>
-          </a:p>
-          <a:p>
-            <a:pPr marL="285750" indent="-285750">
+            <a:pPr marL="342900" indent="-342900">
               <a:buFont typeface="Arial" panose="020B0604020202020204" pitchFamily="34" charset="0"/>
               <a:buChar char="•"/>
             </a:pPr>
@@ -4111,25 +4079,11 @@
                 <a:latin typeface="Source Sans Pro" panose="020B0503030403020204" pitchFamily="34" charset="0"/>
                 <a:ea typeface="Source Sans Pro" panose="020B0503030403020204" pitchFamily="34" charset="0"/>
               </a:rPr>
-              <a:t>Takes string drum type (</a:t>
-            </a:r>
-            <a:r>
-              <a:rPr lang="en-US" sz="2000" dirty="0" err="1">
-                <a:latin typeface="Source Sans Pro" panose="020B0503030403020204" pitchFamily="34" charset="0"/>
-                <a:ea typeface="Source Sans Pro" panose="020B0503030403020204" pitchFamily="34" charset="0"/>
-              </a:rPr>
-              <a:t>hh</a:t>
-            </a:r>
-            <a:r>
-              <a:rPr lang="en-US" sz="2000" dirty="0">
-                <a:latin typeface="Source Sans Pro" panose="020B0503030403020204" pitchFamily="34" charset="0"/>
-                <a:ea typeface="Source Sans Pro" panose="020B0503030403020204" pitchFamily="34" charset="0"/>
-              </a:rPr>
-              <a:t> = “High hat”, td = “Tom drum”) and integer bpm as input</a:t>
-            </a:r>
-          </a:p>
-          <a:p>
-            <a:pPr marL="285750" indent="-285750">
+              <a:t>LEDGroup</a:t>
+            </a:r>
+          </a:p>
+          <a:p>
+            <a:pPr marL="800100" lvl="1" indent="-342900">
               <a:buFont typeface="Arial" panose="020B0604020202020204" pitchFamily="34" charset="0"/>
               <a:buChar char="•"/>
             </a:pPr>
@@ -4138,34 +4092,120 @@
                 <a:latin typeface="Source Sans Pro" panose="020B0503030403020204" pitchFamily="34" charset="0"/>
                 <a:ea typeface="Source Sans Pro" panose="020B0503030403020204" pitchFamily="34" charset="0"/>
               </a:rPr>
-              <a:t>Drives motor through custom rhythm prescribed by drum type at input bpm</a:t>
-            </a:r>
-          </a:p>
-          <a:p>
+              <a:t>All_On, blink_simultaneously, blink_together, all_off</a:t>
+            </a:r>
+          </a:p>
+          <a:p>
+            <a:pPr lvl="1"/>
+            <a:endParaRPr lang="en-US" sz="2000" dirty="0">
+              <a:latin typeface="Source Sans Pro" panose="020B0503030403020204" pitchFamily="34" charset="0"/>
+              <a:ea typeface="Source Sans Pro" panose="020B0503030403020204" pitchFamily="34" charset="0"/>
+            </a:endParaRPr>
+          </a:p>
+          <a:p>
+            <a:pPr marL="342900" indent="-342900">
+              <a:buFont typeface="Arial" panose="020B0604020202020204" pitchFamily="34" charset="0"/>
+              <a:buChar char="•"/>
+            </a:pPr>
             <a:r>
               <a:rPr lang="en-US" sz="2000" dirty="0">
                 <a:latin typeface="Source Sans Pro" panose="020B0503030403020204" pitchFamily="34" charset="0"/>
                 <a:ea typeface="Source Sans Pro" panose="020B0503030403020204" pitchFamily="34" charset="0"/>
               </a:rPr>
-              <a:t>	</a:t>
-            </a:r>
-          </a:p>
-          <a:p>
+              <a:t>Button</a:t>
+            </a:r>
+          </a:p>
+          <a:p>
+            <a:pPr marL="800100" lvl="1" indent="-342900">
+              <a:buFont typeface="Arial" panose="020B0604020202020204" pitchFamily="34" charset="0"/>
+              <a:buChar char="•"/>
+            </a:pPr>
             <a:r>
               <a:rPr lang="en-US" sz="2000" dirty="0">
                 <a:latin typeface="Source Sans Pro" panose="020B0503030403020204" pitchFamily="34" charset="0"/>
                 <a:ea typeface="Source Sans Pro" panose="020B0503030403020204" pitchFamily="34" charset="0"/>
               </a:rPr>
-              <a:t>	</a:t>
-            </a:r>
-          </a:p>
-          <a:p>
+              <a:t>Is_On</a:t>
+            </a:r>
+          </a:p>
+          <a:p>
+            <a:pPr marL="800100" lvl="1" indent="-342900">
+              <a:buFont typeface="Arial" panose="020B0604020202020204" pitchFamily="34" charset="0"/>
+              <a:buChar char="•"/>
+            </a:pPr>
+            <a:endParaRPr lang="en-US" sz="2000" dirty="0">
+              <a:latin typeface="Source Sans Pro" panose="020B0503030403020204" pitchFamily="34" charset="0"/>
+              <a:ea typeface="Source Sans Pro" panose="020B0503030403020204" pitchFamily="34" charset="0"/>
+            </a:endParaRPr>
+          </a:p>
+          <a:p>
+            <a:pPr marL="342900" indent="-342900">
+              <a:buFont typeface="Arial" panose="020B0604020202020204" pitchFamily="34" charset="0"/>
+              <a:buChar char="•"/>
+            </a:pPr>
             <a:r>
               <a:rPr lang="en-US" sz="2000" dirty="0">
                 <a:latin typeface="Source Sans Pro" panose="020B0503030403020204" pitchFamily="34" charset="0"/>
                 <a:ea typeface="Source Sans Pro" panose="020B0503030403020204" pitchFamily="34" charset="0"/>
               </a:rPr>
-              <a:t> </a:t>
+              <a:t>Microphone</a:t>
+            </a:r>
+          </a:p>
+          <a:p>
+            <a:pPr marL="800100" lvl="1" indent="-342900">
+              <a:buFont typeface="Arial" panose="020B0604020202020204" pitchFamily="34" charset="0"/>
+              <a:buChar char="•"/>
+            </a:pPr>
+            <a:r>
+              <a:rPr lang="en-US" sz="2000" dirty="0" err="1">
+                <a:latin typeface="Source Sans Pro" panose="020B0503030403020204" pitchFamily="34" charset="0"/>
+                <a:ea typeface="Source Sans Pro" panose="020B0503030403020204" pitchFamily="34" charset="0"/>
+              </a:rPr>
+              <a:t>audioRead</a:t>
+            </a:r>
+            <a:r>
+              <a:rPr lang="en-US" sz="2000" dirty="0">
+                <a:latin typeface="Source Sans Pro" panose="020B0503030403020204" pitchFamily="34" charset="0"/>
+                <a:ea typeface="Source Sans Pro" panose="020B0503030403020204" pitchFamily="34" charset="0"/>
+              </a:rPr>
+              <a:t>()</a:t>
+            </a:r>
+          </a:p>
+          <a:p>
+            <a:pPr marL="800100" lvl="1" indent="-342900">
+              <a:buFont typeface="Arial" panose="020B0604020202020204" pitchFamily="34" charset="0"/>
+              <a:buChar char="•"/>
+            </a:pPr>
+            <a:r>
+              <a:rPr lang="en-US" sz="2000" dirty="0" err="1">
+                <a:latin typeface="Source Sans Pro" panose="020B0503030403020204" pitchFamily="34" charset="0"/>
+                <a:ea typeface="Source Sans Pro" panose="020B0503030403020204" pitchFamily="34" charset="0"/>
+              </a:rPr>
+              <a:t>extractTempo</a:t>
+            </a:r>
+            <a:r>
+              <a:rPr lang="en-US" sz="2000" dirty="0">
+                <a:latin typeface="Source Sans Pro" panose="020B0503030403020204" pitchFamily="34" charset="0"/>
+                <a:ea typeface="Source Sans Pro" panose="020B0503030403020204" pitchFamily="34" charset="0"/>
+              </a:rPr>
+              <a:t>()</a:t>
+            </a:r>
+          </a:p>
+          <a:p>
+            <a:pPr lvl="1"/>
+            <a:endParaRPr lang="en-US" sz="2000" dirty="0">
+              <a:latin typeface="Source Sans Pro" panose="020B0503030403020204" pitchFamily="34" charset="0"/>
+              <a:ea typeface="Source Sans Pro" panose="020B0503030403020204" pitchFamily="34" charset="0"/>
+            </a:endParaRPr>
+          </a:p>
+          <a:p>
+            <a:pPr lvl="1"/>
+            <a:r>
+              <a:rPr lang="en-US" sz="2000" dirty="0">
+                <a:latin typeface="Source Sans Pro" panose="020B0503030403020204" pitchFamily="34" charset="0"/>
+                <a:ea typeface="Source Sans Pro" panose="020B0503030403020204" pitchFamily="34" charset="0"/>
+              </a:rPr>
+              <a:t>Most of these classes are done or WIP, just need to test them with actual hardware!</a:t>
             </a:r>
           </a:p>
         </p:txBody>
@@ -4175,7 +4215,7 @@
           <p:cNvPr id="5" name="TextBox 4">
             <a:extLst>
               <a:ext uri="{FF2B5EF4-FFF2-40B4-BE49-F238E27FC236}">
-                <a16:creationId xmlns:a16="http://schemas.microsoft.com/office/drawing/2014/main" id="{44FAF6E4-B767-8593-6332-FF9C079B6DB4}"/>
+                <a16:creationId xmlns:a16="http://schemas.microsoft.com/office/drawing/2014/main" id="{5AEC4822-49C5-6ED0-F40E-C91F8B388DE1}"/>
               </a:ext>
             </a:extLst>
           </p:cNvPr>
@@ -4184,7 +4224,7 @@
         </p:nvSpPr>
         <p:spPr>
           <a:xfrm>
-            <a:off x="495300" y="419100"/>
+            <a:off x="304800" y="419100"/>
             <a:ext cx="8382000" cy="553998"/>
           </a:xfrm>
           <a:prstGeom prst="rect">
@@ -4203,7 +4243,7 @@
                 <a:latin typeface="Source Sans Pro" panose="020B0503030403020204" pitchFamily="34" charset="0"/>
                 <a:ea typeface="Source Sans Pro" panose="020B0503030403020204" pitchFamily="34" charset="0"/>
               </a:rPr>
-              <a:t>SPECIFIC FUNCTIONS</a:t>
+              <a:t>CLASSES</a:t>
             </a:r>
           </a:p>
         </p:txBody>
@@ -4211,7 +4251,7 @@
     </p:spTree>
     <p:extLst>
       <p:ext uri="{BB962C8B-B14F-4D97-AF65-F5344CB8AC3E}">
-        <p14:creationId xmlns:p14="http://schemas.microsoft.com/office/powerpoint/2010/main" val="1137734041"/>
+        <p14:creationId xmlns:p14="http://schemas.microsoft.com/office/powerpoint/2010/main" val="618293113"/>
       </p:ext>
     </p:extLst>
   </p:cSld>

</xml_diff>

<commit_message>
Revert "Added microphone class + altered software API!"
This reverts commit 7ff8114d42f2b61b24c9f5bb6a5dc331793f4934.
</commit_message>
<xml_diff>
--- a/project-01/docs/Cooney_Project_01_Software_Diagrams.pptx
+++ b/project-01/docs/Cooney_Project_01_Software_Diagrams.pptx
@@ -9,7 +9,7 @@
     <p:sldId id="257" r:id="rId3"/>
     <p:sldId id="262" r:id="rId4"/>
     <p:sldId id="258" r:id="rId5"/>
-    <p:sldId id="264" r:id="rId6"/>
+    <p:sldId id="259" r:id="rId6"/>
     <p:sldId id="260" r:id="rId7"/>
     <p:sldId id="261" r:id="rId8"/>
   </p:sldIdLst>
@@ -265,7 +265,7 @@
           <a:p>
             <a:fld id="{6F9CC634-B9D1-8E43-9326-87ACE5943230}" type="datetimeFigureOut">
               <a:rPr lang="en-US" smtClean="0"/>
-              <a:t>3/6/23</a:t>
+              <a:t>3/4/23</a:t>
             </a:fld>
             <a:endParaRPr lang="en-US"/>
           </a:p>
@@ -463,7 +463,7 @@
           <a:p>
             <a:fld id="{6F9CC634-B9D1-8E43-9326-87ACE5943230}" type="datetimeFigureOut">
               <a:rPr lang="en-US" smtClean="0"/>
-              <a:t>3/6/23</a:t>
+              <a:t>3/4/23</a:t>
             </a:fld>
             <a:endParaRPr lang="en-US"/>
           </a:p>
@@ -671,7 +671,7 @@
           <a:p>
             <a:fld id="{6F9CC634-B9D1-8E43-9326-87ACE5943230}" type="datetimeFigureOut">
               <a:rPr lang="en-US" smtClean="0"/>
-              <a:t>3/6/23</a:t>
+              <a:t>3/4/23</a:t>
             </a:fld>
             <a:endParaRPr lang="en-US"/>
           </a:p>
@@ -869,7 +869,7 @@
           <a:p>
             <a:fld id="{6F9CC634-B9D1-8E43-9326-87ACE5943230}" type="datetimeFigureOut">
               <a:rPr lang="en-US" smtClean="0"/>
-              <a:t>3/6/23</a:t>
+              <a:t>3/4/23</a:t>
             </a:fld>
             <a:endParaRPr lang="en-US"/>
           </a:p>
@@ -1144,7 +1144,7 @@
           <a:p>
             <a:fld id="{6F9CC634-B9D1-8E43-9326-87ACE5943230}" type="datetimeFigureOut">
               <a:rPr lang="en-US" smtClean="0"/>
-              <a:t>3/6/23</a:t>
+              <a:t>3/4/23</a:t>
             </a:fld>
             <a:endParaRPr lang="en-US"/>
           </a:p>
@@ -1409,7 +1409,7 @@
           <a:p>
             <a:fld id="{6F9CC634-B9D1-8E43-9326-87ACE5943230}" type="datetimeFigureOut">
               <a:rPr lang="en-US" smtClean="0"/>
-              <a:t>3/6/23</a:t>
+              <a:t>3/4/23</a:t>
             </a:fld>
             <a:endParaRPr lang="en-US"/>
           </a:p>
@@ -1821,7 +1821,7 @@
           <a:p>
             <a:fld id="{6F9CC634-B9D1-8E43-9326-87ACE5943230}" type="datetimeFigureOut">
               <a:rPr lang="en-US" smtClean="0"/>
-              <a:t>3/6/23</a:t>
+              <a:t>3/4/23</a:t>
             </a:fld>
             <a:endParaRPr lang="en-US"/>
           </a:p>
@@ -1962,7 +1962,7 @@
           <a:p>
             <a:fld id="{6F9CC634-B9D1-8E43-9326-87ACE5943230}" type="datetimeFigureOut">
               <a:rPr lang="en-US" smtClean="0"/>
-              <a:t>3/6/23</a:t>
+              <a:t>3/4/23</a:t>
             </a:fld>
             <a:endParaRPr lang="en-US"/>
           </a:p>
@@ -2075,7 +2075,7 @@
           <a:p>
             <a:fld id="{6F9CC634-B9D1-8E43-9326-87ACE5943230}" type="datetimeFigureOut">
               <a:rPr lang="en-US" smtClean="0"/>
-              <a:t>3/6/23</a:t>
+              <a:t>3/4/23</a:t>
             </a:fld>
             <a:endParaRPr lang="en-US"/>
           </a:p>
@@ -2386,7 +2386,7 @@
           <a:p>
             <a:fld id="{6F9CC634-B9D1-8E43-9326-87ACE5943230}" type="datetimeFigureOut">
               <a:rPr lang="en-US" smtClean="0"/>
-              <a:t>3/6/23</a:t>
+              <a:t>3/4/23</a:t>
             </a:fld>
             <a:endParaRPr lang="en-US"/>
           </a:p>
@@ -2674,7 +2674,7 @@
           <a:p>
             <a:fld id="{6F9CC634-B9D1-8E43-9326-87ACE5943230}" type="datetimeFigureOut">
               <a:rPr lang="en-US" smtClean="0"/>
-              <a:t>3/6/23</a:t>
+              <a:t>3/4/23</a:t>
             </a:fld>
             <a:endParaRPr lang="en-US"/>
           </a:p>
@@ -2915,7 +2915,7 @@
           <a:p>
             <a:fld id="{6F9CC634-B9D1-8E43-9326-87ACE5943230}" type="datetimeFigureOut">
               <a:rPr lang="en-US" smtClean="0"/>
-              <a:t>3/6/23</a:t>
+              <a:t>3/4/23</a:t>
             </a:fld>
             <a:endParaRPr lang="en-US"/>
           </a:p>
@@ -4011,7 +4011,7 @@
           <p:cNvPr id="4" name="TextBox 3">
             <a:extLst>
               <a:ext uri="{FF2B5EF4-FFF2-40B4-BE49-F238E27FC236}">
-                <a16:creationId xmlns:a16="http://schemas.microsoft.com/office/drawing/2014/main" id="{3101E37C-D4B0-B640-23D0-EF90BDFCCFE2}"/>
+                <a16:creationId xmlns:a16="http://schemas.microsoft.com/office/drawing/2014/main" id="{CA272C79-6916-8C2B-CA7B-F1B0C6A0FFA9}"/>
               </a:ext>
             </a:extLst>
           </p:cNvPr>
@@ -4020,8 +4020,8 @@
         </p:nvSpPr>
         <p:spPr>
           <a:xfrm>
-            <a:off x="495300" y="1079848"/>
-            <a:ext cx="11696700" cy="4401205"/>
+            <a:off x="990600" y="1219200"/>
+            <a:ext cx="11696700" cy="3170099"/>
           </a:xfrm>
           <a:prstGeom prst="rect">
             <a:avLst/>
@@ -4034,7 +4034,23 @@
           </a:bodyPr>
           <a:lstStyle/>
           <a:p>
-            <a:pPr marL="342900" indent="-342900">
+            <a:r>
+              <a:rPr lang="en-US" sz="2000" dirty="0" err="1">
+                <a:latin typeface="Source Sans Pro" panose="020B0503030403020204" pitchFamily="34" charset="0"/>
+                <a:ea typeface="Source Sans Pro" panose="020B0503030403020204" pitchFamily="34" charset="0"/>
+              </a:rPr>
+              <a:t>ledBlink</a:t>
+            </a:r>
+            <a:r>
+              <a:rPr lang="en-US" sz="2000" dirty="0">
+                <a:latin typeface="Source Sans Pro" panose="020B0503030403020204" pitchFamily="34" charset="0"/>
+                <a:ea typeface="Source Sans Pro" panose="020B0503030403020204" pitchFamily="34" charset="0"/>
+              </a:rPr>
+              <a:t>(tempo)</a:t>
+            </a:r>
+          </a:p>
+          <a:p>
+            <a:pPr marL="285750" indent="-285750">
               <a:buFont typeface="Arial" panose="020B0604020202020204" pitchFamily="34" charset="0"/>
               <a:buChar char="•"/>
             </a:pPr>
@@ -4043,11 +4059,11 @@
                 <a:latin typeface="Source Sans Pro" panose="020B0503030403020204" pitchFamily="34" charset="0"/>
                 <a:ea typeface="Source Sans Pro" panose="020B0503030403020204" pitchFamily="34" charset="0"/>
               </a:rPr>
-              <a:t>Motor</a:t>
-            </a:r>
-          </a:p>
-          <a:p>
-            <a:pPr marL="800100" lvl="1" indent="-342900">
+              <a:t>Takes integer bpm as input</a:t>
+            </a:r>
+          </a:p>
+          <a:p>
+            <a:pPr marL="285750" indent="-285750">
               <a:buFont typeface="Arial" panose="020B0604020202020204" pitchFamily="34" charset="0"/>
               <a:buChar char="•"/>
             </a:pPr>
@@ -4056,11 +4072,11 @@
                 <a:latin typeface="Source Sans Pro" panose="020B0503030403020204" pitchFamily="34" charset="0"/>
                 <a:ea typeface="Source Sans Pro" panose="020B0503030403020204" pitchFamily="34" charset="0"/>
               </a:rPr>
-              <a:t>driveMeasure(), drive4(), setup</a:t>
-            </a:r>
-          </a:p>
-          <a:p>
-            <a:pPr marL="800100" lvl="1" indent="-342900">
+              <a:t>Activates individual LEDs consecutively to generate visual 4-beat measure</a:t>
+            </a:r>
+          </a:p>
+          <a:p>
+            <a:pPr marL="285750" indent="-285750">
               <a:buFont typeface="Arial" panose="020B0604020202020204" pitchFamily="34" charset="0"/>
               <a:buChar char="•"/>
             </a:pPr>
@@ -4070,7 +4086,23 @@
             </a:endParaRPr>
           </a:p>
           <a:p>
-            <a:pPr marL="342900" indent="-342900">
+            <a:r>
+              <a:rPr lang="en-US" sz="2000" dirty="0" err="1">
+                <a:latin typeface="Source Sans Pro" panose="020B0503030403020204" pitchFamily="34" charset="0"/>
+                <a:ea typeface="Source Sans Pro" panose="020B0503030403020204" pitchFamily="34" charset="0"/>
+              </a:rPr>
+              <a:t>driveMotor</a:t>
+            </a:r>
+            <a:r>
+              <a:rPr lang="en-US" sz="2000" dirty="0">
+                <a:latin typeface="Source Sans Pro" panose="020B0503030403020204" pitchFamily="34" charset="0"/>
+                <a:ea typeface="Source Sans Pro" panose="020B0503030403020204" pitchFamily="34" charset="0"/>
+              </a:rPr>
+              <a:t>(type, tempo)</a:t>
+            </a:r>
+          </a:p>
+          <a:p>
+            <a:pPr marL="285750" indent="-285750">
               <a:buFont typeface="Arial" panose="020B0604020202020204" pitchFamily="34" charset="0"/>
               <a:buChar char="•"/>
             </a:pPr>
@@ -4079,11 +4111,25 @@
                 <a:latin typeface="Source Sans Pro" panose="020B0503030403020204" pitchFamily="34" charset="0"/>
                 <a:ea typeface="Source Sans Pro" panose="020B0503030403020204" pitchFamily="34" charset="0"/>
               </a:rPr>
-              <a:t>LEDGroup</a:t>
-            </a:r>
-          </a:p>
-          <a:p>
-            <a:pPr marL="800100" lvl="1" indent="-342900">
+              <a:t>Takes string drum type (</a:t>
+            </a:r>
+            <a:r>
+              <a:rPr lang="en-US" sz="2000" dirty="0" err="1">
+                <a:latin typeface="Source Sans Pro" panose="020B0503030403020204" pitchFamily="34" charset="0"/>
+                <a:ea typeface="Source Sans Pro" panose="020B0503030403020204" pitchFamily="34" charset="0"/>
+              </a:rPr>
+              <a:t>hh</a:t>
+            </a:r>
+            <a:r>
+              <a:rPr lang="en-US" sz="2000" dirty="0">
+                <a:latin typeface="Source Sans Pro" panose="020B0503030403020204" pitchFamily="34" charset="0"/>
+                <a:ea typeface="Source Sans Pro" panose="020B0503030403020204" pitchFamily="34" charset="0"/>
+              </a:rPr>
+              <a:t> = “High hat”, td = “Tom drum”) and integer bpm as input</a:t>
+            </a:r>
+          </a:p>
+          <a:p>
+            <a:pPr marL="285750" indent="-285750">
               <a:buFont typeface="Arial" panose="020B0604020202020204" pitchFamily="34" charset="0"/>
               <a:buChar char="•"/>
             </a:pPr>
@@ -4092,120 +4138,34 @@
                 <a:latin typeface="Source Sans Pro" panose="020B0503030403020204" pitchFamily="34" charset="0"/>
                 <a:ea typeface="Source Sans Pro" panose="020B0503030403020204" pitchFamily="34" charset="0"/>
               </a:rPr>
-              <a:t>All_On, blink_simultaneously, blink_together, all_off</a:t>
-            </a:r>
-          </a:p>
-          <a:p>
-            <a:pPr lvl="1"/>
-            <a:endParaRPr lang="en-US" sz="2000" dirty="0">
-              <a:latin typeface="Source Sans Pro" panose="020B0503030403020204" pitchFamily="34" charset="0"/>
-              <a:ea typeface="Source Sans Pro" panose="020B0503030403020204" pitchFamily="34" charset="0"/>
-            </a:endParaRPr>
-          </a:p>
-          <a:p>
-            <a:pPr marL="342900" indent="-342900">
-              <a:buFont typeface="Arial" panose="020B0604020202020204" pitchFamily="34" charset="0"/>
-              <a:buChar char="•"/>
-            </a:pPr>
+              <a:t>Drives motor through custom rhythm prescribed by drum type at input bpm</a:t>
+            </a:r>
+          </a:p>
+          <a:p>
             <a:r>
               <a:rPr lang="en-US" sz="2000" dirty="0">
                 <a:latin typeface="Source Sans Pro" panose="020B0503030403020204" pitchFamily="34" charset="0"/>
                 <a:ea typeface="Source Sans Pro" panose="020B0503030403020204" pitchFamily="34" charset="0"/>
               </a:rPr>
-              <a:t>Button</a:t>
-            </a:r>
-          </a:p>
-          <a:p>
-            <a:pPr marL="800100" lvl="1" indent="-342900">
-              <a:buFont typeface="Arial" panose="020B0604020202020204" pitchFamily="34" charset="0"/>
-              <a:buChar char="•"/>
-            </a:pPr>
+              <a:t>	</a:t>
+            </a:r>
+          </a:p>
+          <a:p>
             <a:r>
               <a:rPr lang="en-US" sz="2000" dirty="0">
                 <a:latin typeface="Source Sans Pro" panose="020B0503030403020204" pitchFamily="34" charset="0"/>
                 <a:ea typeface="Source Sans Pro" panose="020B0503030403020204" pitchFamily="34" charset="0"/>
               </a:rPr>
-              <a:t>Is_On</a:t>
-            </a:r>
-          </a:p>
-          <a:p>
-            <a:pPr marL="800100" lvl="1" indent="-342900">
-              <a:buFont typeface="Arial" panose="020B0604020202020204" pitchFamily="34" charset="0"/>
-              <a:buChar char="•"/>
-            </a:pPr>
-            <a:endParaRPr lang="en-US" sz="2000" dirty="0">
-              <a:latin typeface="Source Sans Pro" panose="020B0503030403020204" pitchFamily="34" charset="0"/>
-              <a:ea typeface="Source Sans Pro" panose="020B0503030403020204" pitchFamily="34" charset="0"/>
-            </a:endParaRPr>
-          </a:p>
-          <a:p>
-            <a:pPr marL="342900" indent="-342900">
-              <a:buFont typeface="Arial" panose="020B0604020202020204" pitchFamily="34" charset="0"/>
-              <a:buChar char="•"/>
-            </a:pPr>
+              <a:t>	</a:t>
+            </a:r>
+          </a:p>
+          <a:p>
             <a:r>
               <a:rPr lang="en-US" sz="2000" dirty="0">
                 <a:latin typeface="Source Sans Pro" panose="020B0503030403020204" pitchFamily="34" charset="0"/>
                 <a:ea typeface="Source Sans Pro" panose="020B0503030403020204" pitchFamily="34" charset="0"/>
               </a:rPr>
-              <a:t>Microphone</a:t>
-            </a:r>
-          </a:p>
-          <a:p>
-            <a:pPr marL="800100" lvl="1" indent="-342900">
-              <a:buFont typeface="Arial" panose="020B0604020202020204" pitchFamily="34" charset="0"/>
-              <a:buChar char="•"/>
-            </a:pPr>
-            <a:r>
-              <a:rPr lang="en-US" sz="2000" dirty="0" err="1">
-                <a:latin typeface="Source Sans Pro" panose="020B0503030403020204" pitchFamily="34" charset="0"/>
-                <a:ea typeface="Source Sans Pro" panose="020B0503030403020204" pitchFamily="34" charset="0"/>
-              </a:rPr>
-              <a:t>audioRead</a:t>
-            </a:r>
-            <a:r>
-              <a:rPr lang="en-US" sz="2000" dirty="0">
-                <a:latin typeface="Source Sans Pro" panose="020B0503030403020204" pitchFamily="34" charset="0"/>
-                <a:ea typeface="Source Sans Pro" panose="020B0503030403020204" pitchFamily="34" charset="0"/>
-              </a:rPr>
-              <a:t>()</a:t>
-            </a:r>
-          </a:p>
-          <a:p>
-            <a:pPr marL="800100" lvl="1" indent="-342900">
-              <a:buFont typeface="Arial" panose="020B0604020202020204" pitchFamily="34" charset="0"/>
-              <a:buChar char="•"/>
-            </a:pPr>
-            <a:r>
-              <a:rPr lang="en-US" sz="2000" dirty="0" err="1">
-                <a:latin typeface="Source Sans Pro" panose="020B0503030403020204" pitchFamily="34" charset="0"/>
-                <a:ea typeface="Source Sans Pro" panose="020B0503030403020204" pitchFamily="34" charset="0"/>
-              </a:rPr>
-              <a:t>extractTempo</a:t>
-            </a:r>
-            <a:r>
-              <a:rPr lang="en-US" sz="2000" dirty="0">
-                <a:latin typeface="Source Sans Pro" panose="020B0503030403020204" pitchFamily="34" charset="0"/>
-                <a:ea typeface="Source Sans Pro" panose="020B0503030403020204" pitchFamily="34" charset="0"/>
-              </a:rPr>
-              <a:t>()</a:t>
-            </a:r>
-          </a:p>
-          <a:p>
-            <a:pPr lvl="1"/>
-            <a:endParaRPr lang="en-US" sz="2000" dirty="0">
-              <a:latin typeface="Source Sans Pro" panose="020B0503030403020204" pitchFamily="34" charset="0"/>
-              <a:ea typeface="Source Sans Pro" panose="020B0503030403020204" pitchFamily="34" charset="0"/>
-            </a:endParaRPr>
-          </a:p>
-          <a:p>
-            <a:pPr lvl="1"/>
-            <a:r>
-              <a:rPr lang="en-US" sz="2000" dirty="0">
-                <a:latin typeface="Source Sans Pro" panose="020B0503030403020204" pitchFamily="34" charset="0"/>
-                <a:ea typeface="Source Sans Pro" panose="020B0503030403020204" pitchFamily="34" charset="0"/>
-              </a:rPr>
-              <a:t>Most of these classes are done or WIP, just need to test them with actual hardware!</a:t>
+              <a:t> </a:t>
             </a:r>
           </a:p>
         </p:txBody>
@@ -4215,7 +4175,7 @@
           <p:cNvPr id="5" name="TextBox 4">
             <a:extLst>
               <a:ext uri="{FF2B5EF4-FFF2-40B4-BE49-F238E27FC236}">
-                <a16:creationId xmlns:a16="http://schemas.microsoft.com/office/drawing/2014/main" id="{5AEC4822-49C5-6ED0-F40E-C91F8B388DE1}"/>
+                <a16:creationId xmlns:a16="http://schemas.microsoft.com/office/drawing/2014/main" id="{44FAF6E4-B767-8593-6332-FF9C079B6DB4}"/>
               </a:ext>
             </a:extLst>
           </p:cNvPr>
@@ -4224,7 +4184,7 @@
         </p:nvSpPr>
         <p:spPr>
           <a:xfrm>
-            <a:off x="304800" y="419100"/>
+            <a:off x="495300" y="419100"/>
             <a:ext cx="8382000" cy="553998"/>
           </a:xfrm>
           <a:prstGeom prst="rect">
@@ -4243,7 +4203,7 @@
                 <a:latin typeface="Source Sans Pro" panose="020B0503030403020204" pitchFamily="34" charset="0"/>
                 <a:ea typeface="Source Sans Pro" panose="020B0503030403020204" pitchFamily="34" charset="0"/>
               </a:rPr>
-              <a:t>CLASSES</a:t>
+              <a:t>SPECIFIC FUNCTIONS</a:t>
             </a:r>
           </a:p>
         </p:txBody>
@@ -4251,7 +4211,7 @@
     </p:spTree>
     <p:extLst>
       <p:ext uri="{BB962C8B-B14F-4D97-AF65-F5344CB8AC3E}">
-        <p14:creationId xmlns:p14="http://schemas.microsoft.com/office/powerpoint/2010/main" val="618293113"/>
+        <p14:creationId xmlns:p14="http://schemas.microsoft.com/office/powerpoint/2010/main" val="1137734041"/>
       </p:ext>
     </p:extLst>
   </p:cSld>

</xml_diff>

<commit_message>
Re-Added delete files and updated test code
yaaay
</commit_message>
<xml_diff>
--- a/project-01/docs/Cooney_Project_01_Software_Diagrams.pptx
+++ b/project-01/docs/Cooney_Project_01_Software_Diagrams.pptx
@@ -9,7 +9,7 @@
     <p:sldId id="257" r:id="rId3"/>
     <p:sldId id="262" r:id="rId4"/>
     <p:sldId id="258" r:id="rId5"/>
-    <p:sldId id="259" r:id="rId6"/>
+    <p:sldId id="264" r:id="rId6"/>
     <p:sldId id="260" r:id="rId7"/>
     <p:sldId id="261" r:id="rId8"/>
   </p:sldIdLst>
@@ -265,7 +265,7 @@
           <a:p>
             <a:fld id="{6F9CC634-B9D1-8E43-9326-87ACE5943230}" type="datetimeFigureOut">
               <a:rPr lang="en-US" smtClean="0"/>
-              <a:t>3/4/23</a:t>
+              <a:t>3/6/23</a:t>
             </a:fld>
             <a:endParaRPr lang="en-US"/>
           </a:p>
@@ -463,7 +463,7 @@
           <a:p>
             <a:fld id="{6F9CC634-B9D1-8E43-9326-87ACE5943230}" type="datetimeFigureOut">
               <a:rPr lang="en-US" smtClean="0"/>
-              <a:t>3/4/23</a:t>
+              <a:t>3/6/23</a:t>
             </a:fld>
             <a:endParaRPr lang="en-US"/>
           </a:p>
@@ -671,7 +671,7 @@
           <a:p>
             <a:fld id="{6F9CC634-B9D1-8E43-9326-87ACE5943230}" type="datetimeFigureOut">
               <a:rPr lang="en-US" smtClean="0"/>
-              <a:t>3/4/23</a:t>
+              <a:t>3/6/23</a:t>
             </a:fld>
             <a:endParaRPr lang="en-US"/>
           </a:p>
@@ -869,7 +869,7 @@
           <a:p>
             <a:fld id="{6F9CC634-B9D1-8E43-9326-87ACE5943230}" type="datetimeFigureOut">
               <a:rPr lang="en-US" smtClean="0"/>
-              <a:t>3/4/23</a:t>
+              <a:t>3/6/23</a:t>
             </a:fld>
             <a:endParaRPr lang="en-US"/>
           </a:p>
@@ -1144,7 +1144,7 @@
           <a:p>
             <a:fld id="{6F9CC634-B9D1-8E43-9326-87ACE5943230}" type="datetimeFigureOut">
               <a:rPr lang="en-US" smtClean="0"/>
-              <a:t>3/4/23</a:t>
+              <a:t>3/6/23</a:t>
             </a:fld>
             <a:endParaRPr lang="en-US"/>
           </a:p>
@@ -1409,7 +1409,7 @@
           <a:p>
             <a:fld id="{6F9CC634-B9D1-8E43-9326-87ACE5943230}" type="datetimeFigureOut">
               <a:rPr lang="en-US" smtClean="0"/>
-              <a:t>3/4/23</a:t>
+              <a:t>3/6/23</a:t>
             </a:fld>
             <a:endParaRPr lang="en-US"/>
           </a:p>
@@ -1821,7 +1821,7 @@
           <a:p>
             <a:fld id="{6F9CC634-B9D1-8E43-9326-87ACE5943230}" type="datetimeFigureOut">
               <a:rPr lang="en-US" smtClean="0"/>
-              <a:t>3/4/23</a:t>
+              <a:t>3/6/23</a:t>
             </a:fld>
             <a:endParaRPr lang="en-US"/>
           </a:p>
@@ -1962,7 +1962,7 @@
           <a:p>
             <a:fld id="{6F9CC634-B9D1-8E43-9326-87ACE5943230}" type="datetimeFigureOut">
               <a:rPr lang="en-US" smtClean="0"/>
-              <a:t>3/4/23</a:t>
+              <a:t>3/6/23</a:t>
             </a:fld>
             <a:endParaRPr lang="en-US"/>
           </a:p>
@@ -2075,7 +2075,7 @@
           <a:p>
             <a:fld id="{6F9CC634-B9D1-8E43-9326-87ACE5943230}" type="datetimeFigureOut">
               <a:rPr lang="en-US" smtClean="0"/>
-              <a:t>3/4/23</a:t>
+              <a:t>3/6/23</a:t>
             </a:fld>
             <a:endParaRPr lang="en-US"/>
           </a:p>
@@ -2386,7 +2386,7 @@
           <a:p>
             <a:fld id="{6F9CC634-B9D1-8E43-9326-87ACE5943230}" type="datetimeFigureOut">
               <a:rPr lang="en-US" smtClean="0"/>
-              <a:t>3/4/23</a:t>
+              <a:t>3/6/23</a:t>
             </a:fld>
             <a:endParaRPr lang="en-US"/>
           </a:p>
@@ -2674,7 +2674,7 @@
           <a:p>
             <a:fld id="{6F9CC634-B9D1-8E43-9326-87ACE5943230}" type="datetimeFigureOut">
               <a:rPr lang="en-US" smtClean="0"/>
-              <a:t>3/4/23</a:t>
+              <a:t>3/6/23</a:t>
             </a:fld>
             <a:endParaRPr lang="en-US"/>
           </a:p>
@@ -2915,7 +2915,7 @@
           <a:p>
             <a:fld id="{6F9CC634-B9D1-8E43-9326-87ACE5943230}" type="datetimeFigureOut">
               <a:rPr lang="en-US" smtClean="0"/>
-              <a:t>3/4/23</a:t>
+              <a:t>3/6/23</a:t>
             </a:fld>
             <a:endParaRPr lang="en-US"/>
           </a:p>
@@ -4011,7 +4011,7 @@
           <p:cNvPr id="4" name="TextBox 3">
             <a:extLst>
               <a:ext uri="{FF2B5EF4-FFF2-40B4-BE49-F238E27FC236}">
-                <a16:creationId xmlns:a16="http://schemas.microsoft.com/office/drawing/2014/main" id="{CA272C79-6916-8C2B-CA7B-F1B0C6A0FFA9}"/>
+                <a16:creationId xmlns:a16="http://schemas.microsoft.com/office/drawing/2014/main" id="{3101E37C-D4B0-B640-23D0-EF90BDFCCFE2}"/>
               </a:ext>
             </a:extLst>
           </p:cNvPr>
@@ -4020,8 +4020,8 @@
         </p:nvSpPr>
         <p:spPr>
           <a:xfrm>
-            <a:off x="990600" y="1219200"/>
-            <a:ext cx="11696700" cy="3170099"/>
+            <a:off x="495300" y="1079848"/>
+            <a:ext cx="11696700" cy="4401205"/>
           </a:xfrm>
           <a:prstGeom prst="rect">
             <a:avLst/>
@@ -4034,23 +4034,7 @@
           </a:bodyPr>
           <a:lstStyle/>
           <a:p>
-            <a:r>
-              <a:rPr lang="en-US" sz="2000" dirty="0" err="1">
-                <a:latin typeface="Source Sans Pro" panose="020B0503030403020204" pitchFamily="34" charset="0"/>
-                <a:ea typeface="Source Sans Pro" panose="020B0503030403020204" pitchFamily="34" charset="0"/>
-              </a:rPr>
-              <a:t>ledBlink</a:t>
-            </a:r>
-            <a:r>
-              <a:rPr lang="en-US" sz="2000" dirty="0">
-                <a:latin typeface="Source Sans Pro" panose="020B0503030403020204" pitchFamily="34" charset="0"/>
-                <a:ea typeface="Source Sans Pro" panose="020B0503030403020204" pitchFamily="34" charset="0"/>
-              </a:rPr>
-              <a:t>(tempo)</a:t>
-            </a:r>
-          </a:p>
-          <a:p>
-            <a:pPr marL="285750" indent="-285750">
+            <a:pPr marL="342900" indent="-342900">
               <a:buFont typeface="Arial" panose="020B0604020202020204" pitchFamily="34" charset="0"/>
               <a:buChar char="•"/>
             </a:pPr>
@@ -4059,11 +4043,11 @@
                 <a:latin typeface="Source Sans Pro" panose="020B0503030403020204" pitchFamily="34" charset="0"/>
                 <a:ea typeface="Source Sans Pro" panose="020B0503030403020204" pitchFamily="34" charset="0"/>
               </a:rPr>
-              <a:t>Takes integer bpm as input</a:t>
-            </a:r>
-          </a:p>
-          <a:p>
-            <a:pPr marL="285750" indent="-285750">
+              <a:t>Motor</a:t>
+            </a:r>
+          </a:p>
+          <a:p>
+            <a:pPr marL="800100" lvl="1" indent="-342900">
               <a:buFont typeface="Arial" panose="020B0604020202020204" pitchFamily="34" charset="0"/>
               <a:buChar char="•"/>
             </a:pPr>
@@ -4072,11 +4056,11 @@
                 <a:latin typeface="Source Sans Pro" panose="020B0503030403020204" pitchFamily="34" charset="0"/>
                 <a:ea typeface="Source Sans Pro" panose="020B0503030403020204" pitchFamily="34" charset="0"/>
               </a:rPr>
-              <a:t>Activates individual LEDs consecutively to generate visual 4-beat measure</a:t>
-            </a:r>
-          </a:p>
-          <a:p>
-            <a:pPr marL="285750" indent="-285750">
+              <a:t>driveMeasure(), drive4(), setup</a:t>
+            </a:r>
+          </a:p>
+          <a:p>
+            <a:pPr marL="800100" lvl="1" indent="-342900">
               <a:buFont typeface="Arial" panose="020B0604020202020204" pitchFamily="34" charset="0"/>
               <a:buChar char="•"/>
             </a:pPr>
@@ -4086,23 +4070,7 @@
             </a:endParaRPr>
           </a:p>
           <a:p>
-            <a:r>
-              <a:rPr lang="en-US" sz="2000" dirty="0" err="1">
-                <a:latin typeface="Source Sans Pro" panose="020B0503030403020204" pitchFamily="34" charset="0"/>
-                <a:ea typeface="Source Sans Pro" panose="020B0503030403020204" pitchFamily="34" charset="0"/>
-              </a:rPr>
-              <a:t>driveMotor</a:t>
-            </a:r>
-            <a:r>
-              <a:rPr lang="en-US" sz="2000" dirty="0">
-                <a:latin typeface="Source Sans Pro" panose="020B0503030403020204" pitchFamily="34" charset="0"/>
-                <a:ea typeface="Source Sans Pro" panose="020B0503030403020204" pitchFamily="34" charset="0"/>
-              </a:rPr>
-              <a:t>(type, tempo)</a:t>
-            </a:r>
-          </a:p>
-          <a:p>
-            <a:pPr marL="285750" indent="-285750">
+            <a:pPr marL="342900" indent="-342900">
               <a:buFont typeface="Arial" panose="020B0604020202020204" pitchFamily="34" charset="0"/>
               <a:buChar char="•"/>
             </a:pPr>
@@ -4111,25 +4079,11 @@
                 <a:latin typeface="Source Sans Pro" panose="020B0503030403020204" pitchFamily="34" charset="0"/>
                 <a:ea typeface="Source Sans Pro" panose="020B0503030403020204" pitchFamily="34" charset="0"/>
               </a:rPr>
-              <a:t>Takes string drum type (</a:t>
-            </a:r>
-            <a:r>
-              <a:rPr lang="en-US" sz="2000" dirty="0" err="1">
-                <a:latin typeface="Source Sans Pro" panose="020B0503030403020204" pitchFamily="34" charset="0"/>
-                <a:ea typeface="Source Sans Pro" panose="020B0503030403020204" pitchFamily="34" charset="0"/>
-              </a:rPr>
-              <a:t>hh</a:t>
-            </a:r>
-            <a:r>
-              <a:rPr lang="en-US" sz="2000" dirty="0">
-                <a:latin typeface="Source Sans Pro" panose="020B0503030403020204" pitchFamily="34" charset="0"/>
-                <a:ea typeface="Source Sans Pro" panose="020B0503030403020204" pitchFamily="34" charset="0"/>
-              </a:rPr>
-              <a:t> = “High hat”, td = “Tom drum”) and integer bpm as input</a:t>
-            </a:r>
-          </a:p>
-          <a:p>
-            <a:pPr marL="285750" indent="-285750">
+              <a:t>LEDGroup</a:t>
+            </a:r>
+          </a:p>
+          <a:p>
+            <a:pPr marL="800100" lvl="1" indent="-342900">
               <a:buFont typeface="Arial" panose="020B0604020202020204" pitchFamily="34" charset="0"/>
               <a:buChar char="•"/>
             </a:pPr>
@@ -4138,34 +4092,120 @@
                 <a:latin typeface="Source Sans Pro" panose="020B0503030403020204" pitchFamily="34" charset="0"/>
                 <a:ea typeface="Source Sans Pro" panose="020B0503030403020204" pitchFamily="34" charset="0"/>
               </a:rPr>
-              <a:t>Drives motor through custom rhythm prescribed by drum type at input bpm</a:t>
-            </a:r>
-          </a:p>
-          <a:p>
+              <a:t>All_On, blink_simultaneously, blink_together, all_off</a:t>
+            </a:r>
+          </a:p>
+          <a:p>
+            <a:pPr lvl="1"/>
+            <a:endParaRPr lang="en-US" sz="2000" dirty="0">
+              <a:latin typeface="Source Sans Pro" panose="020B0503030403020204" pitchFamily="34" charset="0"/>
+              <a:ea typeface="Source Sans Pro" panose="020B0503030403020204" pitchFamily="34" charset="0"/>
+            </a:endParaRPr>
+          </a:p>
+          <a:p>
+            <a:pPr marL="342900" indent="-342900">
+              <a:buFont typeface="Arial" panose="020B0604020202020204" pitchFamily="34" charset="0"/>
+              <a:buChar char="•"/>
+            </a:pPr>
             <a:r>
               <a:rPr lang="en-US" sz="2000" dirty="0">
                 <a:latin typeface="Source Sans Pro" panose="020B0503030403020204" pitchFamily="34" charset="0"/>
                 <a:ea typeface="Source Sans Pro" panose="020B0503030403020204" pitchFamily="34" charset="0"/>
               </a:rPr>
-              <a:t>	</a:t>
-            </a:r>
-          </a:p>
-          <a:p>
+              <a:t>Button</a:t>
+            </a:r>
+          </a:p>
+          <a:p>
+            <a:pPr marL="800100" lvl="1" indent="-342900">
+              <a:buFont typeface="Arial" panose="020B0604020202020204" pitchFamily="34" charset="0"/>
+              <a:buChar char="•"/>
+            </a:pPr>
             <a:r>
               <a:rPr lang="en-US" sz="2000" dirty="0">
                 <a:latin typeface="Source Sans Pro" panose="020B0503030403020204" pitchFamily="34" charset="0"/>
                 <a:ea typeface="Source Sans Pro" panose="020B0503030403020204" pitchFamily="34" charset="0"/>
               </a:rPr>
-              <a:t>	</a:t>
-            </a:r>
-          </a:p>
-          <a:p>
+              <a:t>Is_On</a:t>
+            </a:r>
+          </a:p>
+          <a:p>
+            <a:pPr marL="800100" lvl="1" indent="-342900">
+              <a:buFont typeface="Arial" panose="020B0604020202020204" pitchFamily="34" charset="0"/>
+              <a:buChar char="•"/>
+            </a:pPr>
+            <a:endParaRPr lang="en-US" sz="2000" dirty="0">
+              <a:latin typeface="Source Sans Pro" panose="020B0503030403020204" pitchFamily="34" charset="0"/>
+              <a:ea typeface="Source Sans Pro" panose="020B0503030403020204" pitchFamily="34" charset="0"/>
+            </a:endParaRPr>
+          </a:p>
+          <a:p>
+            <a:pPr marL="342900" indent="-342900">
+              <a:buFont typeface="Arial" panose="020B0604020202020204" pitchFamily="34" charset="0"/>
+              <a:buChar char="•"/>
+            </a:pPr>
             <a:r>
               <a:rPr lang="en-US" sz="2000" dirty="0">
                 <a:latin typeface="Source Sans Pro" panose="020B0503030403020204" pitchFamily="34" charset="0"/>
                 <a:ea typeface="Source Sans Pro" panose="020B0503030403020204" pitchFamily="34" charset="0"/>
               </a:rPr>
-              <a:t> </a:t>
+              <a:t>Microphone</a:t>
+            </a:r>
+          </a:p>
+          <a:p>
+            <a:pPr marL="800100" lvl="1" indent="-342900">
+              <a:buFont typeface="Arial" panose="020B0604020202020204" pitchFamily="34" charset="0"/>
+              <a:buChar char="•"/>
+            </a:pPr>
+            <a:r>
+              <a:rPr lang="en-US" sz="2000" dirty="0" err="1">
+                <a:latin typeface="Source Sans Pro" panose="020B0503030403020204" pitchFamily="34" charset="0"/>
+                <a:ea typeface="Source Sans Pro" panose="020B0503030403020204" pitchFamily="34" charset="0"/>
+              </a:rPr>
+              <a:t>audioRead</a:t>
+            </a:r>
+            <a:r>
+              <a:rPr lang="en-US" sz="2000" dirty="0">
+                <a:latin typeface="Source Sans Pro" panose="020B0503030403020204" pitchFamily="34" charset="0"/>
+                <a:ea typeface="Source Sans Pro" panose="020B0503030403020204" pitchFamily="34" charset="0"/>
+              </a:rPr>
+              <a:t>()</a:t>
+            </a:r>
+          </a:p>
+          <a:p>
+            <a:pPr marL="800100" lvl="1" indent="-342900">
+              <a:buFont typeface="Arial" panose="020B0604020202020204" pitchFamily="34" charset="0"/>
+              <a:buChar char="•"/>
+            </a:pPr>
+            <a:r>
+              <a:rPr lang="en-US" sz="2000" dirty="0" err="1">
+                <a:latin typeface="Source Sans Pro" panose="020B0503030403020204" pitchFamily="34" charset="0"/>
+                <a:ea typeface="Source Sans Pro" panose="020B0503030403020204" pitchFamily="34" charset="0"/>
+              </a:rPr>
+              <a:t>extractTempo</a:t>
+            </a:r>
+            <a:r>
+              <a:rPr lang="en-US" sz="2000" dirty="0">
+                <a:latin typeface="Source Sans Pro" panose="020B0503030403020204" pitchFamily="34" charset="0"/>
+                <a:ea typeface="Source Sans Pro" panose="020B0503030403020204" pitchFamily="34" charset="0"/>
+              </a:rPr>
+              <a:t>()</a:t>
+            </a:r>
+          </a:p>
+          <a:p>
+            <a:pPr lvl="1"/>
+            <a:endParaRPr lang="en-US" sz="2000" dirty="0">
+              <a:latin typeface="Source Sans Pro" panose="020B0503030403020204" pitchFamily="34" charset="0"/>
+              <a:ea typeface="Source Sans Pro" panose="020B0503030403020204" pitchFamily="34" charset="0"/>
+            </a:endParaRPr>
+          </a:p>
+          <a:p>
+            <a:pPr lvl="1"/>
+            <a:r>
+              <a:rPr lang="en-US" sz="2000" dirty="0">
+                <a:latin typeface="Source Sans Pro" panose="020B0503030403020204" pitchFamily="34" charset="0"/>
+                <a:ea typeface="Source Sans Pro" panose="020B0503030403020204" pitchFamily="34" charset="0"/>
+              </a:rPr>
+              <a:t>Most of these classes are done or WIP, just need to test them with actual hardware!</a:t>
             </a:r>
           </a:p>
         </p:txBody>
@@ -4175,7 +4215,7 @@
           <p:cNvPr id="5" name="TextBox 4">
             <a:extLst>
               <a:ext uri="{FF2B5EF4-FFF2-40B4-BE49-F238E27FC236}">
-                <a16:creationId xmlns:a16="http://schemas.microsoft.com/office/drawing/2014/main" id="{44FAF6E4-B767-8593-6332-FF9C079B6DB4}"/>
+                <a16:creationId xmlns:a16="http://schemas.microsoft.com/office/drawing/2014/main" id="{5AEC4822-49C5-6ED0-F40E-C91F8B388DE1}"/>
               </a:ext>
             </a:extLst>
           </p:cNvPr>
@@ -4184,7 +4224,7 @@
         </p:nvSpPr>
         <p:spPr>
           <a:xfrm>
-            <a:off x="495300" y="419100"/>
+            <a:off x="304800" y="419100"/>
             <a:ext cx="8382000" cy="553998"/>
           </a:xfrm>
           <a:prstGeom prst="rect">
@@ -4203,7 +4243,7 @@
                 <a:latin typeface="Source Sans Pro" panose="020B0503030403020204" pitchFamily="34" charset="0"/>
                 <a:ea typeface="Source Sans Pro" panose="020B0503030403020204" pitchFamily="34" charset="0"/>
               </a:rPr>
-              <a:t>SPECIFIC FUNCTIONS</a:t>
+              <a:t>CLASSES</a:t>
             </a:r>
           </a:p>
         </p:txBody>
@@ -4211,7 +4251,7 @@
     </p:spTree>
     <p:extLst>
       <p:ext uri="{BB962C8B-B14F-4D97-AF65-F5344CB8AC3E}">
-        <p14:creationId xmlns:p14="http://schemas.microsoft.com/office/powerpoint/2010/main" val="1137734041"/>
+        <p14:creationId xmlns:p14="http://schemas.microsoft.com/office/powerpoint/2010/main" val="618293113"/>
       </p:ext>
     </p:extLst>
   </p:cSld>

</xml_diff>